<commit_message>
Added codeForces problems and graph problems
</commit_message>
<xml_diff>
--- a/img/YouTube_Cover_ThumNail.pptx
+++ b/img/YouTube_Cover_ThumNail.pptx
@@ -5,12 +5,13 @@
     <p:sldMasterId id="2147483648" r:id="rId1"/>
   </p:sldMasterIdLst>
   <p:notesMasterIdLst>
-    <p:notesMasterId r:id="rId5"/>
+    <p:notesMasterId r:id="rId6"/>
   </p:notesMasterIdLst>
   <p:sldIdLst>
     <p:sldId id="258" r:id="rId2"/>
     <p:sldId id="259" r:id="rId3"/>
     <p:sldId id="260" r:id="rId4"/>
+    <p:sldId id="261" r:id="rId5"/>
   </p:sldIdLst>
   <p:sldSz cx="12192000" cy="6858000"/>
   <p:notesSz cx="6858000" cy="9144000"/>
@@ -117,6 +118,7 @@
             <p14:sldId id="258"/>
             <p14:sldId id="259"/>
             <p14:sldId id="260"/>
+            <p14:sldId id="261"/>
           </p14:sldIdLst>
         </p14:section>
       </p14:sectionLst>
@@ -210,7 +212,7 @@
           <a:p>
             <a:fld id="{B4A751E8-9267-481F-9ED0-3D6415FC7452}" type="datetimeFigureOut">
               <a:rPr lang="en-GB" smtClean="0"/>
-              <a:t>19/02/2021</a:t>
+              <a:t>20/03/2021</a:t>
             </a:fld>
             <a:endParaRPr lang="en-GB"/>
           </a:p>
@@ -562,6 +564,251 @@
 </p:notes>
 </file>
 
+<file path=ppt/notesSlides/notesSlide2.xml><?xml version="1.0" encoding="utf-8"?>
+<p:notes xmlns:a="http://schemas.openxmlformats.org/drawingml/2006/main" xmlns:r="http://schemas.openxmlformats.org/officeDocument/2006/relationships" xmlns:p="http://schemas.openxmlformats.org/presentationml/2006/main">
+  <p:cSld>
+    <p:spTree>
+      <p:nvGrpSpPr>
+        <p:cNvPr id="1" name=""/>
+        <p:cNvGrpSpPr/>
+        <p:nvPr/>
+      </p:nvGrpSpPr>
+      <p:grpSpPr>
+        <a:xfrm>
+          <a:off x="0" y="0"/>
+          <a:ext cx="0" cy="0"/>
+          <a:chOff x="0" y="0"/>
+          <a:chExt cx="0" cy="0"/>
+        </a:xfrm>
+      </p:grpSpPr>
+      <p:sp>
+        <p:nvSpPr>
+          <p:cNvPr id="2" name="Slide Image Placeholder 1"/>
+          <p:cNvSpPr>
+            <a:spLocks noGrp="1" noRot="1" noChangeAspect="1"/>
+          </p:cNvSpPr>
+          <p:nvPr>
+            <p:ph type="sldImg"/>
+          </p:nvPr>
+        </p:nvSpPr>
+        <p:spPr/>
+      </p:sp>
+      <p:sp>
+        <p:nvSpPr>
+          <p:cNvPr id="3" name="Notes Placeholder 2"/>
+          <p:cNvSpPr>
+            <a:spLocks noGrp="1"/>
+          </p:cNvSpPr>
+          <p:nvPr>
+            <p:ph type="body" idx="1"/>
+          </p:nvPr>
+        </p:nvSpPr>
+        <p:spPr/>
+        <p:txBody>
+          <a:bodyPr/>
+          <a:lstStyle/>
+          <a:p>
+            <a:r>
+              <a:rPr lang="en-AU" dirty="0"/>
+              <a:t>Hi all,</a:t>
+            </a:r>
+          </a:p>
+          <a:p>
+            <a:endParaRPr lang="en-AU" dirty="0"/>
+          </a:p>
+          <a:p>
+            <a:r>
+              <a:rPr lang="en-AU" dirty="0"/>
+              <a:t>I have been using vs code and </a:t>
+            </a:r>
+            <a:r>
+              <a:rPr lang="en-AU" dirty="0" err="1"/>
+              <a:t>vlab</a:t>
+            </a:r>
+            <a:r>
+              <a:rPr lang="en-AU" dirty="0"/>
+              <a:t> and have never had any issue with compiling the .c files until this afternoon.</a:t>
+            </a:r>
+          </a:p>
+          <a:p>
+            <a:endParaRPr lang="en-AU" dirty="0"/>
+          </a:p>
+          <a:p>
+            <a:r>
+              <a:rPr lang="en-AU" dirty="0"/>
+              <a:t>This happened after I create a repo on </a:t>
+            </a:r>
+            <a:r>
+              <a:rPr lang="en-AU" dirty="0" err="1"/>
+              <a:t>github</a:t>
+            </a:r>
+            <a:r>
+              <a:rPr lang="en-AU" dirty="0"/>
+              <a:t> and push the code to </a:t>
+            </a:r>
+            <a:r>
+              <a:rPr lang="en-AU" dirty="0" err="1"/>
+              <a:t>github</a:t>
+            </a:r>
+            <a:r>
+              <a:rPr lang="en-AU" dirty="0"/>
+              <a:t>. I have tried both gcc and dcc compilers.</a:t>
+            </a:r>
+          </a:p>
+          <a:p>
+            <a:r>
+              <a:rPr lang="en-AU" dirty="0"/>
+              <a:t>The file is in the correct folder. </a:t>
+            </a:r>
+          </a:p>
+          <a:p>
+            <a:endParaRPr lang="en-AU" dirty="0"/>
+          </a:p>
+          <a:p>
+            <a:r>
+              <a:rPr lang="en-AU" dirty="0"/>
+              <a:t>I have tried the followings:</a:t>
+            </a:r>
+          </a:p>
+          <a:p>
+            <a:pPr marL="228600" indent="-228600">
+              <a:buAutoNum type="arabicPeriod"/>
+            </a:pPr>
+            <a:r>
+              <a:rPr lang="en-AU" dirty="0"/>
+              <a:t>Is –l to ensure the file is in my correct folder.</a:t>
+            </a:r>
+          </a:p>
+          <a:p>
+            <a:pPr marL="228600" indent="-228600">
+              <a:buAutoNum type="arabicPeriod"/>
+            </a:pPr>
+            <a:r>
+              <a:rPr lang="en-AU" dirty="0"/>
+              <a:t>Reboot my computer </a:t>
+            </a:r>
+          </a:p>
+          <a:p>
+            <a:pPr marL="228600" indent="-228600">
+              <a:buAutoNum type="arabicPeriod"/>
+            </a:pPr>
+            <a:r>
+              <a:rPr lang="en-AU" dirty="0"/>
+              <a:t>Reinstall Cygwin and VS code </a:t>
+            </a:r>
+          </a:p>
+          <a:p>
+            <a:pPr marL="228600" indent="-228600">
+              <a:buAutoNum type="arabicPeriod"/>
+            </a:pPr>
+            <a:r>
+              <a:rPr lang="en-AU" dirty="0"/>
+              <a:t>When I use full file path (as per Stack overflow advice) , it does compile.  There is no need for me to use the full file path previously. </a:t>
+            </a:r>
+          </a:p>
+          <a:p>
+            <a:pPr marL="228600" indent="-228600">
+              <a:buAutoNum type="arabicPeriod"/>
+            </a:pPr>
+            <a:r>
+              <a:rPr lang="en-AU" dirty="0"/>
+              <a:t>Same command dcc –o c_1_array.c array gives me two different error message. </a:t>
+            </a:r>
+          </a:p>
+          <a:p>
+            <a:pPr marL="685800" lvl="1" indent="-228600">
+              <a:buAutoNum type="arabicPeriod"/>
+            </a:pPr>
+            <a:r>
+              <a:rPr lang="en-AU" dirty="0"/>
+              <a:t>The first one is in the screenshot above.</a:t>
+            </a:r>
+          </a:p>
+          <a:p>
+            <a:pPr marL="685800" lvl="1" indent="-228600">
+              <a:buAutoNum type="arabicPeriod"/>
+            </a:pPr>
+            <a:r>
+              <a:rPr lang="en-AU" dirty="0"/>
+              <a:t>Second one is </a:t>
+            </a:r>
+            <a:r>
+              <a:rPr lang="en-US" dirty="0"/>
+              <a:t>dcc: will not overwrite c_1_array.c with machine code</a:t>
+            </a:r>
+            <a:r>
+              <a:rPr lang="en-AU" dirty="0"/>
+              <a:t>.</a:t>
+            </a:r>
+          </a:p>
+          <a:p>
+            <a:pPr marL="685800" lvl="1" indent="-228600">
+              <a:buAutoNum type="arabicPeriod"/>
+            </a:pPr>
+            <a:endParaRPr lang="en-AU" dirty="0"/>
+          </a:p>
+          <a:p>
+            <a:pPr marL="685800" lvl="1" indent="-228600">
+              <a:buAutoNum type="arabicPeriod"/>
+            </a:pPr>
+            <a:endParaRPr lang="en-AU" dirty="0"/>
+          </a:p>
+          <a:p>
+            <a:pPr marL="685800" lvl="1" indent="-228600">
+              <a:buAutoNum type="arabicPeriod"/>
+            </a:pPr>
+            <a:endParaRPr lang="en-AU" dirty="0"/>
+          </a:p>
+          <a:p>
+            <a:pPr marL="228600" indent="-228600">
+              <a:buAutoNum type="arabicPeriod"/>
+            </a:pPr>
+            <a:endParaRPr lang="en-AU" dirty="0"/>
+          </a:p>
+          <a:p>
+            <a:pPr marL="228600" indent="-228600">
+              <a:buAutoNum type="arabicPeriod"/>
+            </a:pPr>
+            <a:endParaRPr lang="en-GB" dirty="0"/>
+          </a:p>
+        </p:txBody>
+      </p:sp>
+      <p:sp>
+        <p:nvSpPr>
+          <p:cNvPr id="4" name="Slide Number Placeholder 3"/>
+          <p:cNvSpPr>
+            <a:spLocks noGrp="1"/>
+          </p:cNvSpPr>
+          <p:nvPr>
+            <p:ph type="sldNum" sz="quarter" idx="5"/>
+          </p:nvPr>
+        </p:nvSpPr>
+        <p:spPr/>
+        <p:txBody>
+          <a:bodyPr/>
+          <a:lstStyle/>
+          <a:p>
+            <a:fld id="{D1697A1D-03AC-4A29-BAD3-B37511599B23}" type="slidenum">
+              <a:rPr lang="en-GB" smtClean="0"/>
+              <a:t>4</a:t>
+            </a:fld>
+            <a:endParaRPr lang="en-GB"/>
+          </a:p>
+        </p:txBody>
+      </p:sp>
+    </p:spTree>
+    <p:extLst>
+      <p:ext uri="{BB962C8B-B14F-4D97-AF65-F5344CB8AC3E}">
+        <p14:creationId xmlns:p14="http://schemas.microsoft.com/office/powerpoint/2010/main" val="2119186039"/>
+      </p:ext>
+    </p:extLst>
+  </p:cSld>
+  <p:clrMapOvr>
+    <a:masterClrMapping/>
+  </p:clrMapOvr>
+</p:notes>
+</file>
+
 <file path=ppt/slideLayouts/slideLayout1.xml><?xml version="1.0" encoding="utf-8"?>
 <p:sldLayout xmlns:a="http://schemas.openxmlformats.org/drawingml/2006/main" xmlns:r="http://schemas.openxmlformats.org/officeDocument/2006/relationships" xmlns:p="http://schemas.openxmlformats.org/presentationml/2006/main" type="title" preserve="1">
   <p:cSld name="Title Slide">
@@ -711,7 +958,7 @@
           <a:p>
             <a:fld id="{188BF436-F16F-4603-92E4-D1574BDBC4A4}" type="datetime1">
               <a:rPr lang="en-GB" smtClean="0"/>
-              <a:t>19/02/2021</a:t>
+              <a:t>20/03/2021</a:t>
             </a:fld>
             <a:endParaRPr lang="en-GB"/>
           </a:p>
@@ -922,7 +1169,7 @@
           <a:p>
             <a:fld id="{86319EE0-2199-4C14-9330-47D01590C563}" type="datetime1">
               <a:rPr lang="en-GB" smtClean="0"/>
-              <a:t>19/02/2021</a:t>
+              <a:t>20/03/2021</a:t>
             </a:fld>
             <a:endParaRPr lang="en-GB"/>
           </a:p>
@@ -1132,7 +1379,7 @@
           <a:p>
             <a:fld id="{8413743D-70CB-4B22-9D8C-6A61F233BA03}" type="datetime1">
               <a:rPr lang="en-GB" smtClean="0"/>
-              <a:t>19/02/2021</a:t>
+              <a:t>20/03/2021</a:t>
             </a:fld>
             <a:endParaRPr lang="en-GB"/>
           </a:p>
@@ -1370,7 +1617,7 @@
           <a:p>
             <a:fld id="{1F5CCAE8-4D96-4549-9B26-67BE77590409}" type="datetime1">
               <a:rPr lang="en-GB" smtClean="0"/>
-              <a:t>19/02/2021</a:t>
+              <a:t>20/03/2021</a:t>
             </a:fld>
             <a:endParaRPr lang="en-GB"/>
           </a:p>
@@ -1657,7 +1904,7 @@
           <a:p>
             <a:fld id="{1E40AF74-DC1E-4A34-AC51-5749F9A40A2B}" type="datetime1">
               <a:rPr lang="en-GB" smtClean="0"/>
-              <a:t>19/02/2021</a:t>
+              <a:t>20/03/2021</a:t>
             </a:fld>
             <a:endParaRPr lang="en-GB"/>
           </a:p>
@@ -1925,7 +2172,7 @@
           <a:p>
             <a:fld id="{F2911F06-1F61-46F0-98FA-985AD34D79D8}" type="datetime1">
               <a:rPr lang="en-GB" smtClean="0"/>
-              <a:t>19/02/2021</a:t>
+              <a:t>20/03/2021</a:t>
             </a:fld>
             <a:endParaRPr lang="en-GB"/>
           </a:p>
@@ -2340,7 +2587,7 @@
           <a:p>
             <a:fld id="{AA12B8BD-A8D3-4D79-B172-2519D907C88E}" type="datetime1">
               <a:rPr lang="en-GB" smtClean="0"/>
-              <a:t>19/02/2021</a:t>
+              <a:t>20/03/2021</a:t>
             </a:fld>
             <a:endParaRPr lang="en-GB"/>
           </a:p>
@@ -2482,7 +2729,7 @@
           <a:p>
             <a:fld id="{A215096B-72B5-4BA6-B096-ED1C8F8A2694}" type="datetime1">
               <a:rPr lang="en-GB" smtClean="0"/>
-              <a:t>19/02/2021</a:t>
+              <a:t>20/03/2021</a:t>
             </a:fld>
             <a:endParaRPr lang="en-GB"/>
           </a:p>
@@ -2595,7 +2842,7 @@
           <a:p>
             <a:fld id="{3756A7BE-7E7F-40AF-98D4-C6405B56EF8B}" type="datetime1">
               <a:rPr lang="en-GB" smtClean="0"/>
-              <a:t>19/02/2021</a:t>
+              <a:t>20/03/2021</a:t>
             </a:fld>
             <a:endParaRPr lang="en-GB"/>
           </a:p>
@@ -2908,7 +3155,7 @@
           <a:p>
             <a:fld id="{7B913207-9966-43BE-BCB0-1713BE162CFC}" type="datetime1">
               <a:rPr lang="en-GB" smtClean="0"/>
-              <a:t>19/02/2021</a:t>
+              <a:t>20/03/2021</a:t>
             </a:fld>
             <a:endParaRPr lang="en-GB"/>
           </a:p>
@@ -3197,7 +3444,7 @@
           <a:p>
             <a:fld id="{4EE2E0B5-35C5-47FC-B7BE-B0307860944C}" type="datetime1">
               <a:rPr lang="en-GB" smtClean="0"/>
-              <a:t>19/02/2021</a:t>
+              <a:t>20/03/2021</a:t>
             </a:fld>
             <a:endParaRPr lang="en-GB"/>
           </a:p>
@@ -3440,7 +3687,7 @@
           <a:p>
             <a:fld id="{F2F2B66B-B3BC-4EAB-BFF1-255436213758}" type="datetime1">
               <a:rPr lang="en-GB" smtClean="0"/>
-              <a:t>19/02/2021</a:t>
+              <a:t>20/03/2021</a:t>
             </a:fld>
             <a:endParaRPr lang="en-GB"/>
           </a:p>
@@ -4555,15 +4802,7 @@
           <a:p>
             <a:r>
               <a:rPr lang="en-AU" dirty="0"/>
-              <a:t>What happens when you type </a:t>
-            </a:r>
-            <a:r>
-              <a:rPr lang="en-AU" dirty="0" err="1"/>
-              <a:t>gcc</a:t>
-            </a:r>
-            <a:r>
-              <a:rPr lang="en-AU" dirty="0"/>
-              <a:t>, </a:t>
+              <a:t>What happens when you type gcc, </a:t>
             </a:r>
             <a:r>
               <a:rPr lang="en-AU" dirty="0">
@@ -4705,6 +4944,1142 @@
     <p:extLst>
       <p:ext uri="{BB962C8B-B14F-4D97-AF65-F5344CB8AC3E}">
         <p14:creationId xmlns:p14="http://schemas.microsoft.com/office/powerpoint/2010/main" val="90565726"/>
+      </p:ext>
+    </p:extLst>
+  </p:cSld>
+  <p:clrMapOvr>
+    <a:masterClrMapping/>
+  </p:clrMapOvr>
+</p:sld>
+</file>
+
+<file path=ppt/slides/slide4.xml><?xml version="1.0" encoding="utf-8"?>
+<p:sld xmlns:a="http://schemas.openxmlformats.org/drawingml/2006/main" xmlns:r="http://schemas.openxmlformats.org/officeDocument/2006/relationships" xmlns:p="http://schemas.openxmlformats.org/presentationml/2006/main">
+  <p:cSld>
+    <p:spTree>
+      <p:nvGrpSpPr>
+        <p:cNvPr id="1" name=""/>
+        <p:cNvGrpSpPr/>
+        <p:nvPr/>
+      </p:nvGrpSpPr>
+      <p:grpSpPr>
+        <a:xfrm>
+          <a:off x="0" y="0"/>
+          <a:ext cx="0" cy="0"/>
+          <a:chOff x="0" y="0"/>
+          <a:chExt cx="0" cy="0"/>
+        </a:xfrm>
+      </p:grpSpPr>
+      <p:sp>
+        <p:nvSpPr>
+          <p:cNvPr id="2" name="Slide Number Placeholder 1">
+            <a:extLst>
+              <a:ext uri="{FF2B5EF4-FFF2-40B4-BE49-F238E27FC236}">
+                <a16:creationId xmlns:a16="http://schemas.microsoft.com/office/drawing/2014/main" id="{1C67F296-100E-4743-B122-69E76FCFC60C}"/>
+              </a:ext>
+            </a:extLst>
+          </p:cNvPr>
+          <p:cNvSpPr>
+            <a:spLocks noGrp="1"/>
+          </p:cNvSpPr>
+          <p:nvPr>
+            <p:ph type="sldNum" sz="quarter" idx="12"/>
+          </p:nvPr>
+        </p:nvSpPr>
+        <p:spPr/>
+        <p:txBody>
+          <a:bodyPr/>
+          <a:lstStyle/>
+          <a:p>
+            <a:fld id="{3BAF9B2E-9859-4F2E-A6A3-01D9B22D1947}" type="slidenum">
+              <a:rPr lang="en-GB" smtClean="0"/>
+              <a:t>4</a:t>
+            </a:fld>
+            <a:endParaRPr lang="en-GB"/>
+          </a:p>
+        </p:txBody>
+      </p:sp>
+      <p:pic>
+        <p:nvPicPr>
+          <p:cNvPr id="4" name="Picture 3">
+            <a:extLst>
+              <a:ext uri="{FF2B5EF4-FFF2-40B4-BE49-F238E27FC236}">
+                <a16:creationId xmlns:a16="http://schemas.microsoft.com/office/drawing/2014/main" id="{D7060DB8-E1A7-4409-8E4B-9B73C47C41FB}"/>
+              </a:ext>
+            </a:extLst>
+          </p:cNvPr>
+          <p:cNvPicPr>
+            <a:picLocks noChangeAspect="1"/>
+          </p:cNvPicPr>
+          <p:nvPr/>
+        </p:nvPicPr>
+        <p:blipFill>
+          <a:blip r:embed="rId3"/>
+          <a:stretch>
+            <a:fillRect/>
+          </a:stretch>
+        </p:blipFill>
+        <p:spPr>
+          <a:xfrm>
+            <a:off x="598071" y="535964"/>
+            <a:ext cx="8636771" cy="2893036"/>
+          </a:xfrm>
+          <a:prstGeom prst="rect">
+            <a:avLst/>
+          </a:prstGeom>
+        </p:spPr>
+      </p:pic>
+      <p:sp>
+        <p:nvSpPr>
+          <p:cNvPr id="5" name="Rectangle 4">
+            <a:extLst>
+              <a:ext uri="{FF2B5EF4-FFF2-40B4-BE49-F238E27FC236}">
+                <a16:creationId xmlns:a16="http://schemas.microsoft.com/office/drawing/2014/main" id="{59993C12-C597-4A61-A63B-1C22D86FBD76}"/>
+              </a:ext>
+            </a:extLst>
+          </p:cNvPr>
+          <p:cNvSpPr/>
+          <p:nvPr/>
+        </p:nvSpPr>
+        <p:spPr>
+          <a:xfrm>
+            <a:off x="732678" y="535964"/>
+            <a:ext cx="884255" cy="240272"/>
+          </a:xfrm>
+          <a:prstGeom prst="rect">
+            <a:avLst/>
+          </a:prstGeom>
+          <a:ln>
+            <a:noFill/>
+          </a:ln>
+        </p:spPr>
+        <p:style>
+          <a:lnRef idx="2">
+            <a:schemeClr val="dk1">
+              <a:shade val="50000"/>
+            </a:schemeClr>
+          </a:lnRef>
+          <a:fillRef idx="1">
+            <a:schemeClr val="dk1"/>
+          </a:fillRef>
+          <a:effectRef idx="0">
+            <a:schemeClr val="dk1"/>
+          </a:effectRef>
+          <a:fontRef idx="minor">
+            <a:schemeClr val="lt1"/>
+          </a:fontRef>
+        </p:style>
+        <p:txBody>
+          <a:bodyPr rtlCol="0" anchor="ctr"/>
+          <a:lstStyle/>
+          <a:p>
+            <a:pPr algn="ctr"/>
+            <a:endParaRPr lang="en-GB"/>
+          </a:p>
+        </p:txBody>
+      </p:sp>
+      <p:sp>
+        <p:nvSpPr>
+          <p:cNvPr id="6" name="Rectangle 5">
+            <a:extLst>
+              <a:ext uri="{FF2B5EF4-FFF2-40B4-BE49-F238E27FC236}">
+                <a16:creationId xmlns:a16="http://schemas.microsoft.com/office/drawing/2014/main" id="{E5AB1CF2-DA0E-48DF-8648-815964D5D436}"/>
+              </a:ext>
+            </a:extLst>
+          </p:cNvPr>
+          <p:cNvSpPr/>
+          <p:nvPr/>
+        </p:nvSpPr>
+        <p:spPr>
+          <a:xfrm>
+            <a:off x="732678" y="1502280"/>
+            <a:ext cx="884255" cy="240272"/>
+          </a:xfrm>
+          <a:prstGeom prst="rect">
+            <a:avLst/>
+          </a:prstGeom>
+          <a:ln>
+            <a:noFill/>
+          </a:ln>
+        </p:spPr>
+        <p:style>
+          <a:lnRef idx="2">
+            <a:schemeClr val="dk1">
+              <a:shade val="50000"/>
+            </a:schemeClr>
+          </a:lnRef>
+          <a:fillRef idx="1">
+            <a:schemeClr val="dk1"/>
+          </a:fillRef>
+          <a:effectRef idx="0">
+            <a:schemeClr val="dk1"/>
+          </a:effectRef>
+          <a:fontRef idx="minor">
+            <a:schemeClr val="lt1"/>
+          </a:fontRef>
+        </p:style>
+        <p:txBody>
+          <a:bodyPr rtlCol="0" anchor="ctr"/>
+          <a:lstStyle/>
+          <a:p>
+            <a:pPr algn="ctr"/>
+            <a:endParaRPr lang="en-GB"/>
+          </a:p>
+        </p:txBody>
+      </p:sp>
+      <p:sp>
+        <p:nvSpPr>
+          <p:cNvPr id="7" name="Rectangle 6">
+            <a:extLst>
+              <a:ext uri="{FF2B5EF4-FFF2-40B4-BE49-F238E27FC236}">
+                <a16:creationId xmlns:a16="http://schemas.microsoft.com/office/drawing/2014/main" id="{D2DA4209-BCAD-40E8-A80D-4AC3BDED0FE2}"/>
+              </a:ext>
+            </a:extLst>
+          </p:cNvPr>
+          <p:cNvSpPr/>
+          <p:nvPr/>
+        </p:nvSpPr>
+        <p:spPr>
+          <a:xfrm>
+            <a:off x="732678" y="1982482"/>
+            <a:ext cx="884255" cy="240272"/>
+          </a:xfrm>
+          <a:prstGeom prst="rect">
+            <a:avLst/>
+          </a:prstGeom>
+          <a:ln>
+            <a:noFill/>
+          </a:ln>
+        </p:spPr>
+        <p:style>
+          <a:lnRef idx="2">
+            <a:schemeClr val="dk1">
+              <a:shade val="50000"/>
+            </a:schemeClr>
+          </a:lnRef>
+          <a:fillRef idx="1">
+            <a:schemeClr val="dk1"/>
+          </a:fillRef>
+          <a:effectRef idx="0">
+            <a:schemeClr val="dk1"/>
+          </a:effectRef>
+          <a:fontRef idx="minor">
+            <a:schemeClr val="lt1"/>
+          </a:fontRef>
+        </p:style>
+        <p:txBody>
+          <a:bodyPr rtlCol="0" anchor="ctr"/>
+          <a:lstStyle/>
+          <a:p>
+            <a:pPr algn="ctr"/>
+            <a:endParaRPr lang="en-GB"/>
+          </a:p>
+        </p:txBody>
+      </p:sp>
+      <p:sp>
+        <p:nvSpPr>
+          <p:cNvPr id="8" name="Rectangle: Rounded Corners 7">
+            <a:extLst>
+              <a:ext uri="{FF2B5EF4-FFF2-40B4-BE49-F238E27FC236}">
+                <a16:creationId xmlns:a16="http://schemas.microsoft.com/office/drawing/2014/main" id="{6BB3F35A-E3A9-42E4-ADCE-83FE03321E15}"/>
+              </a:ext>
+            </a:extLst>
+          </p:cNvPr>
+          <p:cNvSpPr/>
+          <p:nvPr/>
+        </p:nvSpPr>
+        <p:spPr>
+          <a:xfrm>
+            <a:off x="732678" y="776236"/>
+            <a:ext cx="4682532" cy="726044"/>
+          </a:xfrm>
+          <a:prstGeom prst="roundRect">
+            <a:avLst/>
+          </a:prstGeom>
+          <a:noFill/>
+          <a:ln w="28575">
+            <a:solidFill>
+              <a:srgbClr val="FF0000"/>
+            </a:solidFill>
+          </a:ln>
+        </p:spPr>
+        <p:style>
+          <a:lnRef idx="2">
+            <a:schemeClr val="accent1">
+              <a:shade val="50000"/>
+            </a:schemeClr>
+          </a:lnRef>
+          <a:fillRef idx="1">
+            <a:schemeClr val="accent1"/>
+          </a:fillRef>
+          <a:effectRef idx="0">
+            <a:schemeClr val="accent1"/>
+          </a:effectRef>
+          <a:fontRef idx="minor">
+            <a:schemeClr val="lt1"/>
+          </a:fontRef>
+        </p:style>
+        <p:txBody>
+          <a:bodyPr rtlCol="0" anchor="ctr"/>
+          <a:lstStyle/>
+          <a:p>
+            <a:pPr algn="ctr"/>
+            <a:endParaRPr lang="en-GB"/>
+          </a:p>
+        </p:txBody>
+      </p:sp>
+      <p:sp>
+        <p:nvSpPr>
+          <p:cNvPr id="9" name="Rectangle: Rounded Corners 8">
+            <a:extLst>
+              <a:ext uri="{FF2B5EF4-FFF2-40B4-BE49-F238E27FC236}">
+                <a16:creationId xmlns:a16="http://schemas.microsoft.com/office/drawing/2014/main" id="{10AE1348-97E2-4E8B-A596-A12A47F60C9F}"/>
+              </a:ext>
+            </a:extLst>
+          </p:cNvPr>
+          <p:cNvSpPr/>
+          <p:nvPr/>
+        </p:nvSpPr>
+        <p:spPr>
+          <a:xfrm>
+            <a:off x="732677" y="1712902"/>
+            <a:ext cx="5416061" cy="269580"/>
+          </a:xfrm>
+          <a:prstGeom prst="roundRect">
+            <a:avLst/>
+          </a:prstGeom>
+          <a:noFill/>
+          <a:ln w="28575">
+            <a:solidFill>
+              <a:srgbClr val="FF0000"/>
+            </a:solidFill>
+          </a:ln>
+        </p:spPr>
+        <p:style>
+          <a:lnRef idx="2">
+            <a:schemeClr val="accent1">
+              <a:shade val="50000"/>
+            </a:schemeClr>
+          </a:lnRef>
+          <a:fillRef idx="1">
+            <a:schemeClr val="accent1"/>
+          </a:fillRef>
+          <a:effectRef idx="0">
+            <a:schemeClr val="accent1"/>
+          </a:effectRef>
+          <a:fontRef idx="minor">
+            <a:schemeClr val="lt1"/>
+          </a:fontRef>
+        </p:style>
+        <p:txBody>
+          <a:bodyPr rtlCol="0" anchor="ctr"/>
+          <a:lstStyle/>
+          <a:p>
+            <a:pPr algn="ctr"/>
+            <a:endParaRPr lang="en-GB"/>
+          </a:p>
+        </p:txBody>
+      </p:sp>
+      <p:sp>
+        <p:nvSpPr>
+          <p:cNvPr id="10" name="Rectangle 9">
+            <a:extLst>
+              <a:ext uri="{FF2B5EF4-FFF2-40B4-BE49-F238E27FC236}">
+                <a16:creationId xmlns:a16="http://schemas.microsoft.com/office/drawing/2014/main" id="{5A842293-DC2D-42B9-B49F-555953CC7BC7}"/>
+              </a:ext>
+            </a:extLst>
+          </p:cNvPr>
+          <p:cNvSpPr/>
+          <p:nvPr/>
+        </p:nvSpPr>
+        <p:spPr>
+          <a:xfrm>
+            <a:off x="5415210" y="773940"/>
+            <a:ext cx="5416060" cy="543005"/>
+          </a:xfrm>
+          <a:prstGeom prst="rect">
+            <a:avLst/>
+          </a:prstGeom>
+          <a:noFill/>
+          <a:ln>
+            <a:noFill/>
+          </a:ln>
+        </p:spPr>
+        <p:style>
+          <a:lnRef idx="2">
+            <a:schemeClr val="accent1">
+              <a:shade val="50000"/>
+            </a:schemeClr>
+          </a:lnRef>
+          <a:fillRef idx="1">
+            <a:schemeClr val="accent1"/>
+          </a:fillRef>
+          <a:effectRef idx="0">
+            <a:schemeClr val="accent1"/>
+          </a:effectRef>
+          <a:fontRef idx="minor">
+            <a:schemeClr val="lt1"/>
+          </a:fontRef>
+        </p:style>
+        <p:txBody>
+          <a:bodyPr rtlCol="0" anchor="ctr"/>
+          <a:lstStyle/>
+          <a:p>
+            <a:pPr algn="ctr"/>
+            <a:r>
+              <a:rPr lang="en-AU" sz="3600" b="1" dirty="0">
+                <a:solidFill>
+                  <a:srgbClr val="FF0000"/>
+                </a:solidFill>
+              </a:rPr>
+              <a:t>Error with both gcc and dcc</a:t>
+            </a:r>
+            <a:endParaRPr lang="en-GB" sz="3600" b="1" dirty="0">
+              <a:solidFill>
+                <a:srgbClr val="FF0000"/>
+              </a:solidFill>
+            </a:endParaRPr>
+          </a:p>
+        </p:txBody>
+      </p:sp>
+      <p:pic>
+        <p:nvPicPr>
+          <p:cNvPr id="12" name="Picture 11">
+            <a:extLst>
+              <a:ext uri="{FF2B5EF4-FFF2-40B4-BE49-F238E27FC236}">
+                <a16:creationId xmlns:a16="http://schemas.microsoft.com/office/drawing/2014/main" id="{87AD3DA1-E290-4BBE-96A6-F697B2D95036}"/>
+              </a:ext>
+            </a:extLst>
+          </p:cNvPr>
+          <p:cNvPicPr>
+            <a:picLocks noChangeAspect="1"/>
+          </p:cNvPicPr>
+          <p:nvPr/>
+        </p:nvPicPr>
+        <p:blipFill>
+          <a:blip r:embed="rId4"/>
+          <a:stretch>
+            <a:fillRect/>
+          </a:stretch>
+        </p:blipFill>
+        <p:spPr>
+          <a:xfrm>
+            <a:off x="598071" y="3910612"/>
+            <a:ext cx="11049077" cy="2171151"/>
+          </a:xfrm>
+          <a:prstGeom prst="rect">
+            <a:avLst/>
+          </a:prstGeom>
+        </p:spPr>
+      </p:pic>
+      <p:sp>
+        <p:nvSpPr>
+          <p:cNvPr id="13" name="Rectangle: Rounded Corners 12">
+            <a:extLst>
+              <a:ext uri="{FF2B5EF4-FFF2-40B4-BE49-F238E27FC236}">
+                <a16:creationId xmlns:a16="http://schemas.microsoft.com/office/drawing/2014/main" id="{EF656F62-CE24-4337-8C89-06B9BD1EB406}"/>
+              </a:ext>
+            </a:extLst>
+          </p:cNvPr>
+          <p:cNvSpPr/>
+          <p:nvPr/>
+        </p:nvSpPr>
+        <p:spPr>
+          <a:xfrm>
+            <a:off x="732676" y="4227676"/>
+            <a:ext cx="10751567" cy="254658"/>
+          </a:xfrm>
+          <a:prstGeom prst="roundRect">
+            <a:avLst/>
+          </a:prstGeom>
+          <a:noFill/>
+          <a:ln w="28575">
+            <a:solidFill>
+              <a:srgbClr val="FF0000"/>
+            </a:solidFill>
+          </a:ln>
+        </p:spPr>
+        <p:style>
+          <a:lnRef idx="2">
+            <a:schemeClr val="accent1">
+              <a:shade val="50000"/>
+            </a:schemeClr>
+          </a:lnRef>
+          <a:fillRef idx="1">
+            <a:schemeClr val="accent1"/>
+          </a:fillRef>
+          <a:effectRef idx="0">
+            <a:schemeClr val="accent1"/>
+          </a:effectRef>
+          <a:fontRef idx="minor">
+            <a:schemeClr val="lt1"/>
+          </a:fontRef>
+        </p:style>
+        <p:txBody>
+          <a:bodyPr rtlCol="0" anchor="ctr"/>
+          <a:lstStyle/>
+          <a:p>
+            <a:pPr algn="ctr"/>
+            <a:endParaRPr lang="en-GB"/>
+          </a:p>
+        </p:txBody>
+      </p:sp>
+      <p:sp>
+        <p:nvSpPr>
+          <p:cNvPr id="14" name="Rectangle 13">
+            <a:extLst>
+              <a:ext uri="{FF2B5EF4-FFF2-40B4-BE49-F238E27FC236}">
+                <a16:creationId xmlns:a16="http://schemas.microsoft.com/office/drawing/2014/main" id="{9A365CEA-508A-4655-9FA7-1F2341B3B170}"/>
+              </a:ext>
+            </a:extLst>
+          </p:cNvPr>
+          <p:cNvSpPr/>
+          <p:nvPr/>
+        </p:nvSpPr>
+        <p:spPr>
+          <a:xfrm>
+            <a:off x="365914" y="-37681"/>
+            <a:ext cx="5416060" cy="543005"/>
+          </a:xfrm>
+          <a:prstGeom prst="rect">
+            <a:avLst/>
+          </a:prstGeom>
+          <a:noFill/>
+          <a:ln>
+            <a:noFill/>
+          </a:ln>
+        </p:spPr>
+        <p:style>
+          <a:lnRef idx="2">
+            <a:schemeClr val="accent1">
+              <a:shade val="50000"/>
+            </a:schemeClr>
+          </a:lnRef>
+          <a:fillRef idx="1">
+            <a:schemeClr val="accent1"/>
+          </a:fillRef>
+          <a:effectRef idx="0">
+            <a:schemeClr val="accent1"/>
+          </a:effectRef>
+          <a:fontRef idx="minor">
+            <a:schemeClr val="lt1"/>
+          </a:fontRef>
+        </p:style>
+        <p:txBody>
+          <a:bodyPr rtlCol="0" anchor="ctr"/>
+          <a:lstStyle/>
+          <a:p>
+            <a:pPr algn="ctr"/>
+            <a:r>
+              <a:rPr lang="en-AU" sz="3600" b="1" dirty="0">
+                <a:solidFill>
+                  <a:srgbClr val="FF0000"/>
+                </a:solidFill>
+              </a:rPr>
+              <a:t>Error with both gcc and dcc</a:t>
+            </a:r>
+            <a:endParaRPr lang="en-GB" sz="3600" b="1" dirty="0">
+              <a:solidFill>
+                <a:srgbClr val="FF0000"/>
+              </a:solidFill>
+            </a:endParaRPr>
+          </a:p>
+        </p:txBody>
+      </p:sp>
+      <p:sp>
+        <p:nvSpPr>
+          <p:cNvPr id="15" name="Rectangle 14">
+            <a:extLst>
+              <a:ext uri="{FF2B5EF4-FFF2-40B4-BE49-F238E27FC236}">
+                <a16:creationId xmlns:a16="http://schemas.microsoft.com/office/drawing/2014/main" id="{AAFFCB25-0634-4CD8-A937-36CC2C22B0A1}"/>
+              </a:ext>
+            </a:extLst>
+          </p:cNvPr>
+          <p:cNvSpPr/>
+          <p:nvPr/>
+        </p:nvSpPr>
+        <p:spPr>
+          <a:xfrm>
+            <a:off x="449707" y="3372510"/>
+            <a:ext cx="5416060" cy="543005"/>
+          </a:xfrm>
+          <a:prstGeom prst="rect">
+            <a:avLst/>
+          </a:prstGeom>
+          <a:noFill/>
+          <a:ln>
+            <a:noFill/>
+          </a:ln>
+        </p:spPr>
+        <p:style>
+          <a:lnRef idx="2">
+            <a:schemeClr val="accent1">
+              <a:shade val="50000"/>
+            </a:schemeClr>
+          </a:lnRef>
+          <a:fillRef idx="1">
+            <a:schemeClr val="accent1"/>
+          </a:fillRef>
+          <a:effectRef idx="0">
+            <a:schemeClr val="accent1"/>
+          </a:effectRef>
+          <a:fontRef idx="minor">
+            <a:schemeClr val="lt1"/>
+          </a:fontRef>
+        </p:style>
+        <p:txBody>
+          <a:bodyPr rtlCol="0" anchor="ctr"/>
+          <a:lstStyle/>
+          <a:p>
+            <a:pPr algn="ctr"/>
+            <a:r>
+              <a:rPr lang="en-AU" sz="3600" b="1" dirty="0">
+                <a:solidFill>
+                  <a:srgbClr val="FFE05C"/>
+                </a:solidFill>
+              </a:rPr>
+              <a:t>Full file path to compile</a:t>
+            </a:r>
+            <a:endParaRPr lang="en-GB" sz="3600" b="1" dirty="0">
+              <a:solidFill>
+                <a:srgbClr val="FFE05C"/>
+              </a:solidFill>
+            </a:endParaRPr>
+          </a:p>
+        </p:txBody>
+      </p:sp>
+      <p:sp>
+        <p:nvSpPr>
+          <p:cNvPr id="16" name="Rectangle: Rounded Corners 15">
+            <a:extLst>
+              <a:ext uri="{FF2B5EF4-FFF2-40B4-BE49-F238E27FC236}">
+                <a16:creationId xmlns:a16="http://schemas.microsoft.com/office/drawing/2014/main" id="{F2B64C16-F21C-45C3-B51E-024FE2952193}"/>
+              </a:ext>
+            </a:extLst>
+          </p:cNvPr>
+          <p:cNvSpPr/>
+          <p:nvPr/>
+        </p:nvSpPr>
+        <p:spPr>
+          <a:xfrm>
+            <a:off x="3688597" y="4492298"/>
+            <a:ext cx="7783186" cy="254658"/>
+          </a:xfrm>
+          <a:prstGeom prst="roundRect">
+            <a:avLst/>
+          </a:prstGeom>
+          <a:noFill/>
+          <a:ln w="28575">
+            <a:solidFill>
+              <a:srgbClr val="92D050"/>
+            </a:solidFill>
+          </a:ln>
+        </p:spPr>
+        <p:style>
+          <a:lnRef idx="2">
+            <a:schemeClr val="accent1">
+              <a:shade val="50000"/>
+            </a:schemeClr>
+          </a:lnRef>
+          <a:fillRef idx="1">
+            <a:schemeClr val="accent1"/>
+          </a:fillRef>
+          <a:effectRef idx="0">
+            <a:schemeClr val="accent1"/>
+          </a:effectRef>
+          <a:fontRef idx="minor">
+            <a:schemeClr val="lt1"/>
+          </a:fontRef>
+        </p:style>
+        <p:txBody>
+          <a:bodyPr rtlCol="0" anchor="ctr"/>
+          <a:lstStyle/>
+          <a:p>
+            <a:pPr algn="ctr"/>
+            <a:endParaRPr lang="en-GB">
+              <a:solidFill>
+                <a:srgbClr val="FFE05C"/>
+              </a:solidFill>
+            </a:endParaRPr>
+          </a:p>
+        </p:txBody>
+      </p:sp>
+      <p:sp>
+        <p:nvSpPr>
+          <p:cNvPr id="17" name="Rectangle 16">
+            <a:extLst>
+              <a:ext uri="{FF2B5EF4-FFF2-40B4-BE49-F238E27FC236}">
+                <a16:creationId xmlns:a16="http://schemas.microsoft.com/office/drawing/2014/main" id="{3B6D9A44-1E7E-40A4-AD74-E07EF69ADF10}"/>
+              </a:ext>
+            </a:extLst>
+          </p:cNvPr>
+          <p:cNvSpPr/>
+          <p:nvPr/>
+        </p:nvSpPr>
+        <p:spPr>
+          <a:xfrm>
+            <a:off x="4566140" y="4815213"/>
+            <a:ext cx="5416060" cy="543005"/>
+          </a:xfrm>
+          <a:prstGeom prst="rect">
+            <a:avLst/>
+          </a:prstGeom>
+          <a:noFill/>
+          <a:ln>
+            <a:noFill/>
+          </a:ln>
+        </p:spPr>
+        <p:style>
+          <a:lnRef idx="2">
+            <a:schemeClr val="accent1">
+              <a:shade val="50000"/>
+            </a:schemeClr>
+          </a:lnRef>
+          <a:fillRef idx="1">
+            <a:schemeClr val="accent1"/>
+          </a:fillRef>
+          <a:effectRef idx="0">
+            <a:schemeClr val="accent1"/>
+          </a:effectRef>
+          <a:fontRef idx="minor">
+            <a:schemeClr val="lt1"/>
+          </a:fontRef>
+        </p:style>
+        <p:txBody>
+          <a:bodyPr rtlCol="0" anchor="ctr"/>
+          <a:lstStyle/>
+          <a:p>
+            <a:pPr algn="ctr"/>
+            <a:endParaRPr lang="en-GB" sz="3600" b="1" dirty="0">
+              <a:solidFill>
+                <a:srgbClr val="FF0000"/>
+              </a:solidFill>
+            </a:endParaRPr>
+          </a:p>
+        </p:txBody>
+      </p:sp>
+      <p:sp>
+        <p:nvSpPr>
+          <p:cNvPr id="18" name="Rectangle: Rounded Corners 17">
+            <a:extLst>
+              <a:ext uri="{FF2B5EF4-FFF2-40B4-BE49-F238E27FC236}">
+                <a16:creationId xmlns:a16="http://schemas.microsoft.com/office/drawing/2014/main" id="{CD59AB59-1B62-45AD-8F33-11C6E78C9E0E}"/>
+              </a:ext>
+            </a:extLst>
+          </p:cNvPr>
+          <p:cNvSpPr/>
+          <p:nvPr/>
+        </p:nvSpPr>
+        <p:spPr>
+          <a:xfrm>
+            <a:off x="6695314" y="2610024"/>
+            <a:ext cx="5375784" cy="1005701"/>
+          </a:xfrm>
+          <a:prstGeom prst="roundRect">
+            <a:avLst/>
+          </a:prstGeom>
+          <a:noFill/>
+          <a:ln w="28575">
+            <a:noFill/>
+          </a:ln>
+        </p:spPr>
+        <p:style>
+          <a:lnRef idx="2">
+            <a:schemeClr val="accent1">
+              <a:shade val="50000"/>
+            </a:schemeClr>
+          </a:lnRef>
+          <a:fillRef idx="1">
+            <a:schemeClr val="accent1"/>
+          </a:fillRef>
+          <a:effectRef idx="0">
+            <a:schemeClr val="accent1"/>
+          </a:effectRef>
+          <a:fontRef idx="minor">
+            <a:schemeClr val="lt1"/>
+          </a:fontRef>
+        </p:style>
+        <p:txBody>
+          <a:bodyPr rtlCol="0" anchor="ctr"/>
+          <a:lstStyle/>
+          <a:p>
+            <a:r>
+              <a:rPr lang="en-AU" sz="2400" dirty="0">
+                <a:solidFill>
+                  <a:schemeClr val="accent2">
+                    <a:lumMod val="60000"/>
+                    <a:lumOff val="40000"/>
+                  </a:schemeClr>
+                </a:solidFill>
+                <a:latin typeface="Arial" panose="020B0604020202020204" pitchFamily="34" charset="0"/>
+                <a:cs typeface="Arial" panose="020B0604020202020204" pitchFamily="34" charset="0"/>
+              </a:rPr>
+              <a:t>There is a main function, but it says that there is no main function.</a:t>
+            </a:r>
+            <a:endParaRPr lang="en-GB" sz="2400" dirty="0">
+              <a:solidFill>
+                <a:schemeClr val="accent2">
+                  <a:lumMod val="60000"/>
+                  <a:lumOff val="40000"/>
+                </a:schemeClr>
+              </a:solidFill>
+              <a:latin typeface="Arial" panose="020B0604020202020204" pitchFamily="34" charset="0"/>
+              <a:cs typeface="Arial" panose="020B0604020202020204" pitchFamily="34" charset="0"/>
+            </a:endParaRPr>
+          </a:p>
+        </p:txBody>
+      </p:sp>
+      <p:cxnSp>
+        <p:nvCxnSpPr>
+          <p:cNvPr id="20" name="Straight Arrow Connector 19">
+            <a:extLst>
+              <a:ext uri="{FF2B5EF4-FFF2-40B4-BE49-F238E27FC236}">
+                <a16:creationId xmlns:a16="http://schemas.microsoft.com/office/drawing/2014/main" id="{8DFE8FFE-59B3-4415-853A-98B25C4C9F88}"/>
+              </a:ext>
+            </a:extLst>
+          </p:cNvPr>
+          <p:cNvCxnSpPr/>
+          <p:nvPr/>
+        </p:nvCxnSpPr>
+        <p:spPr>
+          <a:xfrm flipH="1">
+            <a:off x="7919634" y="3429000"/>
+            <a:ext cx="495946" cy="798676"/>
+          </a:xfrm>
+          <a:prstGeom prst="straightConnector1">
+            <a:avLst/>
+          </a:prstGeom>
+          <a:ln w="57150">
+            <a:solidFill>
+              <a:srgbClr val="C00000"/>
+            </a:solidFill>
+            <a:tailEnd type="triangle"/>
+          </a:ln>
+        </p:spPr>
+        <p:style>
+          <a:lnRef idx="1">
+            <a:schemeClr val="accent1"/>
+          </a:lnRef>
+          <a:fillRef idx="0">
+            <a:schemeClr val="accent1"/>
+          </a:fillRef>
+          <a:effectRef idx="0">
+            <a:schemeClr val="accent1"/>
+          </a:effectRef>
+          <a:fontRef idx="minor">
+            <a:schemeClr val="tx1"/>
+          </a:fontRef>
+        </p:style>
+      </p:cxnSp>
+      <p:sp>
+        <p:nvSpPr>
+          <p:cNvPr id="21" name="Rectangle: Rounded Corners 20">
+            <a:extLst>
+              <a:ext uri="{FF2B5EF4-FFF2-40B4-BE49-F238E27FC236}">
+                <a16:creationId xmlns:a16="http://schemas.microsoft.com/office/drawing/2014/main" id="{816CC5BE-B7E7-4282-B6F2-70197CE2AA61}"/>
+              </a:ext>
+            </a:extLst>
+          </p:cNvPr>
+          <p:cNvSpPr/>
+          <p:nvPr/>
+        </p:nvSpPr>
+        <p:spPr>
+          <a:xfrm>
+            <a:off x="5231741" y="4808465"/>
+            <a:ext cx="6362187" cy="1005701"/>
+          </a:xfrm>
+          <a:prstGeom prst="roundRect">
+            <a:avLst/>
+          </a:prstGeom>
+          <a:noFill/>
+          <a:ln w="28575">
+            <a:noFill/>
+          </a:ln>
+        </p:spPr>
+        <p:style>
+          <a:lnRef idx="2">
+            <a:schemeClr val="accent1">
+              <a:shade val="50000"/>
+            </a:schemeClr>
+          </a:lnRef>
+          <a:fillRef idx="1">
+            <a:schemeClr val="accent1"/>
+          </a:fillRef>
+          <a:effectRef idx="0">
+            <a:schemeClr val="accent1"/>
+          </a:effectRef>
+          <a:fontRef idx="minor">
+            <a:schemeClr val="lt1"/>
+          </a:fontRef>
+        </p:style>
+        <p:txBody>
+          <a:bodyPr rtlCol="0" anchor="ctr"/>
+          <a:lstStyle/>
+          <a:p>
+            <a:r>
+              <a:rPr lang="en-AU" sz="2400" dirty="0">
+                <a:solidFill>
+                  <a:srgbClr val="92D050"/>
+                </a:solidFill>
+                <a:latin typeface="Arial" panose="020B0604020202020204" pitchFamily="34" charset="0"/>
+                <a:cs typeface="Arial" panose="020B0604020202020204" pitchFamily="34" charset="0"/>
+              </a:rPr>
+              <a:t>When I use full file path, it does compile.</a:t>
+            </a:r>
+            <a:endParaRPr lang="en-GB" sz="2400" dirty="0">
+              <a:solidFill>
+                <a:srgbClr val="92D050"/>
+              </a:solidFill>
+              <a:latin typeface="Arial" panose="020B0604020202020204" pitchFamily="34" charset="0"/>
+              <a:cs typeface="Arial" panose="020B0604020202020204" pitchFamily="34" charset="0"/>
+            </a:endParaRPr>
+          </a:p>
+        </p:txBody>
+      </p:sp>
+      <p:sp>
+        <p:nvSpPr>
+          <p:cNvPr id="22" name="Rectangle 21">
+            <a:extLst>
+              <a:ext uri="{FF2B5EF4-FFF2-40B4-BE49-F238E27FC236}">
+                <a16:creationId xmlns:a16="http://schemas.microsoft.com/office/drawing/2014/main" id="{A79F7FEE-C6A2-4684-B87D-D4D0E6B8C692}"/>
+              </a:ext>
+            </a:extLst>
+          </p:cNvPr>
+          <p:cNvSpPr/>
+          <p:nvPr/>
+        </p:nvSpPr>
+        <p:spPr>
+          <a:xfrm>
+            <a:off x="732678" y="3990428"/>
+            <a:ext cx="884255" cy="240272"/>
+          </a:xfrm>
+          <a:prstGeom prst="rect">
+            <a:avLst/>
+          </a:prstGeom>
+          <a:ln>
+            <a:noFill/>
+          </a:ln>
+        </p:spPr>
+        <p:style>
+          <a:lnRef idx="2">
+            <a:schemeClr val="dk1">
+              <a:shade val="50000"/>
+            </a:schemeClr>
+          </a:lnRef>
+          <a:fillRef idx="1">
+            <a:schemeClr val="dk1"/>
+          </a:fillRef>
+          <a:effectRef idx="0">
+            <a:schemeClr val="dk1"/>
+          </a:effectRef>
+          <a:fontRef idx="minor">
+            <a:schemeClr val="lt1"/>
+          </a:fontRef>
+        </p:style>
+        <p:txBody>
+          <a:bodyPr rtlCol="0" anchor="ctr"/>
+          <a:lstStyle/>
+          <a:p>
+            <a:pPr algn="ctr"/>
+            <a:endParaRPr lang="en-GB"/>
+          </a:p>
+        </p:txBody>
+      </p:sp>
+      <p:sp>
+        <p:nvSpPr>
+          <p:cNvPr id="23" name="Rectangle 22">
+            <a:extLst>
+              <a:ext uri="{FF2B5EF4-FFF2-40B4-BE49-F238E27FC236}">
+                <a16:creationId xmlns:a16="http://schemas.microsoft.com/office/drawing/2014/main" id="{B0342230-9E50-45C5-9E07-CFCFC3A60F26}"/>
+              </a:ext>
+            </a:extLst>
+          </p:cNvPr>
+          <p:cNvSpPr/>
+          <p:nvPr/>
+        </p:nvSpPr>
+        <p:spPr>
+          <a:xfrm>
+            <a:off x="732678" y="4758367"/>
+            <a:ext cx="884255" cy="240272"/>
+          </a:xfrm>
+          <a:prstGeom prst="rect">
+            <a:avLst/>
+          </a:prstGeom>
+          <a:ln>
+            <a:noFill/>
+          </a:ln>
+        </p:spPr>
+        <p:style>
+          <a:lnRef idx="2">
+            <a:schemeClr val="dk1">
+              <a:shade val="50000"/>
+            </a:schemeClr>
+          </a:lnRef>
+          <a:fillRef idx="1">
+            <a:schemeClr val="dk1"/>
+          </a:fillRef>
+          <a:effectRef idx="0">
+            <a:schemeClr val="dk1"/>
+          </a:effectRef>
+          <a:fontRef idx="minor">
+            <a:schemeClr val="lt1"/>
+          </a:fontRef>
+        </p:style>
+        <p:txBody>
+          <a:bodyPr rtlCol="0" anchor="ctr"/>
+          <a:lstStyle/>
+          <a:p>
+            <a:pPr algn="ctr"/>
+            <a:endParaRPr lang="en-GB"/>
+          </a:p>
+        </p:txBody>
+      </p:sp>
+      <p:sp>
+        <p:nvSpPr>
+          <p:cNvPr id="24" name="Rectangle 23">
+            <a:extLst>
+              <a:ext uri="{FF2B5EF4-FFF2-40B4-BE49-F238E27FC236}">
+                <a16:creationId xmlns:a16="http://schemas.microsoft.com/office/drawing/2014/main" id="{4018A5BA-C89B-4B5C-AC69-21A1ABB68BE8}"/>
+              </a:ext>
+            </a:extLst>
+          </p:cNvPr>
+          <p:cNvSpPr/>
+          <p:nvPr/>
+        </p:nvSpPr>
+        <p:spPr>
+          <a:xfrm>
+            <a:off x="794303" y="5280405"/>
+            <a:ext cx="884255" cy="240272"/>
+          </a:xfrm>
+          <a:prstGeom prst="rect">
+            <a:avLst/>
+          </a:prstGeom>
+          <a:ln>
+            <a:noFill/>
+          </a:ln>
+        </p:spPr>
+        <p:style>
+          <a:lnRef idx="2">
+            <a:schemeClr val="dk1">
+              <a:shade val="50000"/>
+            </a:schemeClr>
+          </a:lnRef>
+          <a:fillRef idx="1">
+            <a:schemeClr val="dk1"/>
+          </a:fillRef>
+          <a:effectRef idx="0">
+            <a:schemeClr val="dk1"/>
+          </a:effectRef>
+          <a:fontRef idx="minor">
+            <a:schemeClr val="lt1"/>
+          </a:fontRef>
+        </p:style>
+        <p:txBody>
+          <a:bodyPr rtlCol="0" anchor="ctr"/>
+          <a:lstStyle/>
+          <a:p>
+            <a:pPr algn="ctr"/>
+            <a:endParaRPr lang="en-GB"/>
+          </a:p>
+        </p:txBody>
+      </p:sp>
+      <p:sp>
+        <p:nvSpPr>
+          <p:cNvPr id="25" name="Rectangle 24">
+            <a:extLst>
+              <a:ext uri="{FF2B5EF4-FFF2-40B4-BE49-F238E27FC236}">
+                <a16:creationId xmlns:a16="http://schemas.microsoft.com/office/drawing/2014/main" id="{E5A8ECC4-EF13-4AA8-A6AB-E68A793364C3}"/>
+              </a:ext>
+            </a:extLst>
+          </p:cNvPr>
+          <p:cNvSpPr/>
+          <p:nvPr/>
+        </p:nvSpPr>
+        <p:spPr>
+          <a:xfrm>
+            <a:off x="794302" y="4472040"/>
+            <a:ext cx="884255" cy="240272"/>
+          </a:xfrm>
+          <a:prstGeom prst="rect">
+            <a:avLst/>
+          </a:prstGeom>
+          <a:ln>
+            <a:noFill/>
+          </a:ln>
+        </p:spPr>
+        <p:style>
+          <a:lnRef idx="2">
+            <a:schemeClr val="dk1">
+              <a:shade val="50000"/>
+            </a:schemeClr>
+          </a:lnRef>
+          <a:fillRef idx="1">
+            <a:schemeClr val="dk1"/>
+          </a:fillRef>
+          <a:effectRef idx="0">
+            <a:schemeClr val="dk1"/>
+          </a:effectRef>
+          <a:fontRef idx="minor">
+            <a:schemeClr val="lt1"/>
+          </a:fontRef>
+        </p:style>
+        <p:txBody>
+          <a:bodyPr rtlCol="0" anchor="ctr"/>
+          <a:lstStyle/>
+          <a:p>
+            <a:pPr algn="ctr"/>
+            <a:endParaRPr lang="en-GB"/>
+          </a:p>
+        </p:txBody>
+      </p:sp>
+      <p:cxnSp>
+        <p:nvCxnSpPr>
+          <p:cNvPr id="26" name="Straight Arrow Connector 25">
+            <a:extLst>
+              <a:ext uri="{FF2B5EF4-FFF2-40B4-BE49-F238E27FC236}">
+                <a16:creationId xmlns:a16="http://schemas.microsoft.com/office/drawing/2014/main" id="{5A3E0F42-AA89-4C53-9ED8-1C7AD672F9D0}"/>
+              </a:ext>
+            </a:extLst>
+          </p:cNvPr>
+          <p:cNvCxnSpPr>
+            <a:cxnSpLocks/>
+          </p:cNvCxnSpPr>
+          <p:nvPr/>
+        </p:nvCxnSpPr>
+        <p:spPr>
+          <a:xfrm flipH="1" flipV="1">
+            <a:off x="7391840" y="4808466"/>
+            <a:ext cx="915252" cy="254657"/>
+          </a:xfrm>
+          <a:prstGeom prst="straightConnector1">
+            <a:avLst/>
+          </a:prstGeom>
+          <a:ln w="57150">
+            <a:solidFill>
+              <a:srgbClr val="92D050"/>
+            </a:solidFill>
+            <a:tailEnd type="triangle"/>
+          </a:ln>
+        </p:spPr>
+        <p:style>
+          <a:lnRef idx="1">
+            <a:schemeClr val="accent1"/>
+          </a:lnRef>
+          <a:fillRef idx="0">
+            <a:schemeClr val="accent1"/>
+          </a:fillRef>
+          <a:effectRef idx="0">
+            <a:schemeClr val="accent1"/>
+          </a:effectRef>
+          <a:fontRef idx="minor">
+            <a:schemeClr val="tx1"/>
+          </a:fontRef>
+        </p:style>
+      </p:cxnSp>
+    </p:spTree>
+    <p:extLst>
+      <p:ext uri="{BB962C8B-B14F-4D97-AF65-F5344CB8AC3E}">
+        <p14:creationId xmlns:p14="http://schemas.microsoft.com/office/powerpoint/2010/main" val="3663411977"/>
       </p:ext>
     </p:extLst>
   </p:cSld>

</xml_diff>